<commit_message>
Size of elements in relation to the screen resolution
</commit_message>
<xml_diff>
--- a/Images/GUI_loading_images/GUI_loading_images.pptx
+++ b/Images/GUI_loading_images/GUI_loading_images.pptx
@@ -286,7 +286,7 @@
           <a:p>
             <a:fld id="{8487EC4D-881D-49D9-96DC-4A50E5093F85}" type="datetimeFigureOut">
               <a:rPr lang="de-DE" smtClean="0"/>
-              <a:t>30.07.2020</a:t>
+              <a:t>05.08.2021</a:t>
             </a:fld>
             <a:endParaRPr lang="de-DE"/>
           </a:p>
@@ -456,7 +456,7 @@
           <a:p>
             <a:fld id="{8487EC4D-881D-49D9-96DC-4A50E5093F85}" type="datetimeFigureOut">
               <a:rPr lang="de-DE" smtClean="0"/>
-              <a:t>30.07.2020</a:t>
+              <a:t>05.08.2021</a:t>
             </a:fld>
             <a:endParaRPr lang="de-DE"/>
           </a:p>
@@ -636,7 +636,7 @@
           <a:p>
             <a:fld id="{8487EC4D-881D-49D9-96DC-4A50E5093F85}" type="datetimeFigureOut">
               <a:rPr lang="de-DE" smtClean="0"/>
-              <a:t>30.07.2020</a:t>
+              <a:t>05.08.2021</a:t>
             </a:fld>
             <a:endParaRPr lang="de-DE"/>
           </a:p>
@@ -806,7 +806,7 @@
           <a:p>
             <a:fld id="{8487EC4D-881D-49D9-96DC-4A50E5093F85}" type="datetimeFigureOut">
               <a:rPr lang="de-DE" smtClean="0"/>
-              <a:t>30.07.2020</a:t>
+              <a:t>05.08.2021</a:t>
             </a:fld>
             <a:endParaRPr lang="de-DE"/>
           </a:p>
@@ -1052,7 +1052,7 @@
           <a:p>
             <a:fld id="{8487EC4D-881D-49D9-96DC-4A50E5093F85}" type="datetimeFigureOut">
               <a:rPr lang="de-DE" smtClean="0"/>
-              <a:t>30.07.2020</a:t>
+              <a:t>05.08.2021</a:t>
             </a:fld>
             <a:endParaRPr lang="de-DE"/>
           </a:p>
@@ -1284,7 +1284,7 @@
           <a:p>
             <a:fld id="{8487EC4D-881D-49D9-96DC-4A50E5093F85}" type="datetimeFigureOut">
               <a:rPr lang="de-DE" smtClean="0"/>
-              <a:t>30.07.2020</a:t>
+              <a:t>05.08.2021</a:t>
             </a:fld>
             <a:endParaRPr lang="de-DE"/>
           </a:p>
@@ -1651,7 +1651,7 @@
           <a:p>
             <a:fld id="{8487EC4D-881D-49D9-96DC-4A50E5093F85}" type="datetimeFigureOut">
               <a:rPr lang="de-DE" smtClean="0"/>
-              <a:t>30.07.2020</a:t>
+              <a:t>05.08.2021</a:t>
             </a:fld>
             <a:endParaRPr lang="de-DE"/>
           </a:p>
@@ -1769,7 +1769,7 @@
           <a:p>
             <a:fld id="{8487EC4D-881D-49D9-96DC-4A50E5093F85}" type="datetimeFigureOut">
               <a:rPr lang="de-DE" smtClean="0"/>
-              <a:t>30.07.2020</a:t>
+              <a:t>05.08.2021</a:t>
             </a:fld>
             <a:endParaRPr lang="de-DE"/>
           </a:p>
@@ -1864,7 +1864,7 @@
           <a:p>
             <a:fld id="{8487EC4D-881D-49D9-96DC-4A50E5093F85}" type="datetimeFigureOut">
               <a:rPr lang="de-DE" smtClean="0"/>
-              <a:t>30.07.2020</a:t>
+              <a:t>05.08.2021</a:t>
             </a:fld>
             <a:endParaRPr lang="de-DE"/>
           </a:p>
@@ -2141,7 +2141,7 @@
           <a:p>
             <a:fld id="{8487EC4D-881D-49D9-96DC-4A50E5093F85}" type="datetimeFigureOut">
               <a:rPr lang="de-DE" smtClean="0"/>
-              <a:t>30.07.2020</a:t>
+              <a:t>05.08.2021</a:t>
             </a:fld>
             <a:endParaRPr lang="de-DE"/>
           </a:p>
@@ -2398,7 +2398,7 @@
           <a:p>
             <a:fld id="{8487EC4D-881D-49D9-96DC-4A50E5093F85}" type="datetimeFigureOut">
               <a:rPr lang="de-DE" smtClean="0"/>
-              <a:t>30.07.2020</a:t>
+              <a:t>05.08.2021</a:t>
             </a:fld>
             <a:endParaRPr lang="de-DE"/>
           </a:p>
@@ -2611,7 +2611,7 @@
           <a:p>
             <a:fld id="{8487EC4D-881D-49D9-96DC-4A50E5093F85}" type="datetimeFigureOut">
               <a:rPr lang="de-DE" smtClean="0"/>
-              <a:t>30.07.2020</a:t>
+              <a:t>05.08.2021</a:t>
             </a:fld>
             <a:endParaRPr lang="de-DE"/>
           </a:p>
@@ -3057,7 +3057,7 @@
                   <a14:useLocalDpi xmlns:a14="http://schemas.microsoft.com/office/drawing/2010/main" val="0"/>
                 </a:ext>
                 <a:ext uri="{96DAC541-7B7A-43D3-8B79-37D633B846F1}">
-                  <asvg:svgBlip xmlns:asvg="http://schemas.microsoft.com/office/drawing/2016/SVG/main" xmlns="" r:embed="rId3"/>
+                  <asvg:svgBlip xmlns:asvg="http://schemas.microsoft.com/office/drawing/2016/SVG/main" r:embed="rId3"/>
                 </a:ext>
               </a:extLst>
             </a:blip>
@@ -16756,39 +16756,718 @@
       </p:grpSpPr>
       <p:grpSp>
         <p:nvGrpSpPr>
-          <p:cNvPr id="133" name="Gruppieren 132"/>
-          <p:cNvGrpSpPr>
-            <a:grpSpLocks noChangeAspect="1"/>
-          </p:cNvGrpSpPr>
+          <p:cNvPr id="2" name="Gruppieren 1">
+            <a:extLst>
+              <a:ext uri="{FF2B5EF4-FFF2-40B4-BE49-F238E27FC236}">
+                <a16:creationId xmlns:a16="http://schemas.microsoft.com/office/drawing/2014/main" id="{47A933BF-7545-49C6-BBC0-B44B3A3A0D22}"/>
+              </a:ext>
+            </a:extLst>
+          </p:cNvPr>
+          <p:cNvGrpSpPr/>
           <p:nvPr/>
         </p:nvGrpSpPr>
         <p:grpSpPr>
           <a:xfrm>
-            <a:off x="5656800" y="2994320"/>
-            <a:ext cx="878400" cy="869361"/>
-            <a:chOff x="7146653" y="2509469"/>
-            <a:chExt cx="1549264" cy="1533321"/>
+            <a:off x="5556000" y="2889000"/>
+            <a:ext cx="1080000" cy="1080000"/>
+            <a:chOff x="5556000" y="2889000"/>
+            <a:chExt cx="1080000" cy="1080000"/>
           </a:xfrm>
         </p:grpSpPr>
+        <p:grpSp>
+          <p:nvGrpSpPr>
+            <p:cNvPr id="133" name="Gruppieren 132"/>
+            <p:cNvGrpSpPr>
+              <a:grpSpLocks noChangeAspect="1"/>
+            </p:cNvGrpSpPr>
+            <p:nvPr/>
+          </p:nvGrpSpPr>
+          <p:grpSpPr>
+            <a:xfrm>
+              <a:off x="5656800" y="2994320"/>
+              <a:ext cx="878400" cy="869361"/>
+              <a:chOff x="7146653" y="2509469"/>
+              <a:chExt cx="1549264" cy="1533321"/>
+            </a:xfrm>
+          </p:grpSpPr>
+          <p:sp>
+            <p:nvSpPr>
+              <p:cNvPr id="5" name="Ellipse 4"/>
+              <p:cNvSpPr/>
+              <p:nvPr/>
+            </p:nvSpPr>
+            <p:spPr>
+              <a:xfrm rot="352134">
+                <a:off x="7745823" y="3022552"/>
+                <a:ext cx="360000" cy="360000"/>
+              </a:xfrm>
+              <a:prstGeom prst="ellipse">
+                <a:avLst/>
+              </a:prstGeom>
+              <a:noFill/>
+              <a:ln w="38100">
+                <a:solidFill>
+                  <a:srgbClr val="2A82DA"/>
+                </a:solidFill>
+              </a:ln>
+            </p:spPr>
+            <p:style>
+              <a:lnRef idx="2">
+                <a:schemeClr val="accent1">
+                  <a:shade val="50000"/>
+                </a:schemeClr>
+              </a:lnRef>
+              <a:fillRef idx="1">
+                <a:schemeClr val="accent1"/>
+              </a:fillRef>
+              <a:effectRef idx="0">
+                <a:schemeClr val="accent1"/>
+              </a:effectRef>
+              <a:fontRef idx="minor">
+                <a:schemeClr val="lt1"/>
+              </a:fontRef>
+            </p:style>
+            <p:txBody>
+              <a:bodyPr rtlCol="0" anchor="ctr"/>
+              <a:lstStyle/>
+              <a:p>
+                <a:pPr algn="ctr"/>
+                <a:endParaRPr lang="de-DE">
+                  <a:ln>
+                    <a:solidFill>
+                      <a:sysClr val="windowText" lastClr="000000"/>
+                    </a:solidFill>
+                  </a:ln>
+                </a:endParaRPr>
+              </a:p>
+            </p:txBody>
+          </p:sp>
+          <p:sp>
+            <p:nvSpPr>
+              <p:cNvPr id="7" name="Ellipse 6"/>
+              <p:cNvSpPr/>
+              <p:nvPr/>
+            </p:nvSpPr>
+            <p:spPr>
+              <a:xfrm rot="1203084">
+                <a:off x="7153235" y="2735363"/>
+                <a:ext cx="360000" cy="360000"/>
+              </a:xfrm>
+              <a:prstGeom prst="ellipse">
+                <a:avLst/>
+              </a:prstGeom>
+              <a:noFill/>
+              <a:ln w="38100">
+                <a:solidFill>
+                  <a:srgbClr val="2A82DA"/>
+                </a:solidFill>
+              </a:ln>
+            </p:spPr>
+            <p:style>
+              <a:lnRef idx="2">
+                <a:schemeClr val="accent1">
+                  <a:shade val="50000"/>
+                </a:schemeClr>
+              </a:lnRef>
+              <a:fillRef idx="1">
+                <a:schemeClr val="accent1"/>
+              </a:fillRef>
+              <a:effectRef idx="0">
+                <a:schemeClr val="accent1"/>
+              </a:effectRef>
+              <a:fontRef idx="minor">
+                <a:schemeClr val="lt1"/>
+              </a:fontRef>
+            </p:style>
+            <p:txBody>
+              <a:bodyPr rtlCol="0" anchor="ctr"/>
+              <a:lstStyle/>
+              <a:p>
+                <a:pPr algn="ctr"/>
+                <a:endParaRPr lang="de-DE">
+                  <a:ln>
+                    <a:solidFill>
+                      <a:sysClr val="windowText" lastClr="000000"/>
+                    </a:solidFill>
+                  </a:ln>
+                </a:endParaRPr>
+              </a:p>
+            </p:txBody>
+          </p:sp>
+          <p:sp>
+            <p:nvSpPr>
+              <p:cNvPr id="8" name="Ellipse 7"/>
+              <p:cNvSpPr/>
+              <p:nvPr/>
+            </p:nvSpPr>
+            <p:spPr>
+              <a:xfrm rot="460048">
+                <a:off x="8335917" y="3098111"/>
+                <a:ext cx="360000" cy="360000"/>
+              </a:xfrm>
+              <a:prstGeom prst="ellipse">
+                <a:avLst/>
+              </a:prstGeom>
+              <a:noFill/>
+              <a:ln w="38100">
+                <a:solidFill>
+                  <a:srgbClr val="2A82DA"/>
+                </a:solidFill>
+              </a:ln>
+            </p:spPr>
+            <p:style>
+              <a:lnRef idx="2">
+                <a:schemeClr val="accent1">
+                  <a:shade val="50000"/>
+                </a:schemeClr>
+              </a:lnRef>
+              <a:fillRef idx="1">
+                <a:schemeClr val="accent1"/>
+              </a:fillRef>
+              <a:effectRef idx="0">
+                <a:schemeClr val="accent1"/>
+              </a:effectRef>
+              <a:fontRef idx="minor">
+                <a:schemeClr val="lt1"/>
+              </a:fontRef>
+            </p:style>
+            <p:txBody>
+              <a:bodyPr rtlCol="0" anchor="ctr"/>
+              <a:lstStyle/>
+              <a:p>
+                <a:pPr algn="ctr"/>
+                <a:endParaRPr lang="de-DE">
+                  <a:ln>
+                    <a:solidFill>
+                      <a:sysClr val="windowText" lastClr="000000"/>
+                    </a:solidFill>
+                  </a:ln>
+                </a:endParaRPr>
+              </a:p>
+            </p:txBody>
+          </p:sp>
+          <p:sp>
+            <p:nvSpPr>
+              <p:cNvPr id="9" name="Ellipse 8"/>
+              <p:cNvSpPr/>
+              <p:nvPr/>
+            </p:nvSpPr>
+            <p:spPr>
+              <a:xfrm rot="20686386">
+                <a:off x="7740318" y="2509469"/>
+                <a:ext cx="360000" cy="360000"/>
+              </a:xfrm>
+              <a:prstGeom prst="ellipse">
+                <a:avLst/>
+              </a:prstGeom>
+              <a:noFill/>
+              <a:ln w="38100">
+                <a:solidFill>
+                  <a:srgbClr val="2A82DA"/>
+                </a:solidFill>
+              </a:ln>
+            </p:spPr>
+            <p:style>
+              <a:lnRef idx="2">
+                <a:schemeClr val="accent1">
+                  <a:shade val="50000"/>
+                </a:schemeClr>
+              </a:lnRef>
+              <a:fillRef idx="1">
+                <a:schemeClr val="accent1"/>
+              </a:fillRef>
+              <a:effectRef idx="0">
+                <a:schemeClr val="accent1"/>
+              </a:effectRef>
+              <a:fontRef idx="minor">
+                <a:schemeClr val="lt1"/>
+              </a:fontRef>
+            </p:style>
+            <p:txBody>
+              <a:bodyPr rtlCol="0" anchor="ctr"/>
+              <a:lstStyle/>
+              <a:p>
+                <a:pPr algn="ctr"/>
+                <a:endParaRPr lang="de-DE">
+                  <a:ln>
+                    <a:solidFill>
+                      <a:sysClr val="windowText" lastClr="000000"/>
+                    </a:solidFill>
+                  </a:ln>
+                </a:endParaRPr>
+              </a:p>
+            </p:txBody>
+          </p:sp>
+          <p:sp>
+            <p:nvSpPr>
+              <p:cNvPr id="10" name="Ellipse 9"/>
+              <p:cNvSpPr/>
+              <p:nvPr/>
+            </p:nvSpPr>
+            <p:spPr>
+              <a:xfrm>
+                <a:off x="7146653" y="3405708"/>
+                <a:ext cx="360000" cy="360000"/>
+              </a:xfrm>
+              <a:prstGeom prst="ellipse">
+                <a:avLst/>
+              </a:prstGeom>
+              <a:noFill/>
+              <a:ln w="38100">
+                <a:solidFill>
+                  <a:srgbClr val="2A82DA"/>
+                </a:solidFill>
+              </a:ln>
+            </p:spPr>
+            <p:style>
+              <a:lnRef idx="2">
+                <a:schemeClr val="accent1">
+                  <a:shade val="50000"/>
+                </a:schemeClr>
+              </a:lnRef>
+              <a:fillRef idx="1">
+                <a:schemeClr val="accent1"/>
+              </a:fillRef>
+              <a:effectRef idx="0">
+                <a:schemeClr val="accent1"/>
+              </a:effectRef>
+              <a:fontRef idx="minor">
+                <a:schemeClr val="lt1"/>
+              </a:fontRef>
+            </p:style>
+            <p:txBody>
+              <a:bodyPr rtlCol="0" anchor="ctr"/>
+              <a:lstStyle/>
+              <a:p>
+                <a:pPr algn="ctr"/>
+                <a:endParaRPr lang="de-DE">
+                  <a:ln>
+                    <a:solidFill>
+                      <a:sysClr val="windowText" lastClr="000000"/>
+                    </a:solidFill>
+                  </a:ln>
+                </a:endParaRPr>
+              </a:p>
+            </p:txBody>
+          </p:sp>
+          <p:sp>
+            <p:nvSpPr>
+              <p:cNvPr id="11" name="Ellipse 10"/>
+              <p:cNvSpPr/>
+              <p:nvPr/>
+            </p:nvSpPr>
+            <p:spPr>
+              <a:xfrm rot="21427267">
+                <a:off x="7767659" y="3682790"/>
+                <a:ext cx="360000" cy="360000"/>
+              </a:xfrm>
+              <a:prstGeom prst="ellipse">
+                <a:avLst/>
+              </a:prstGeom>
+              <a:noFill/>
+              <a:ln w="38100">
+                <a:solidFill>
+                  <a:srgbClr val="2A82DA"/>
+                </a:solidFill>
+              </a:ln>
+            </p:spPr>
+            <p:style>
+              <a:lnRef idx="2">
+                <a:schemeClr val="accent1">
+                  <a:shade val="50000"/>
+                </a:schemeClr>
+              </a:lnRef>
+              <a:fillRef idx="1">
+                <a:schemeClr val="accent1"/>
+              </a:fillRef>
+              <a:effectRef idx="0">
+                <a:schemeClr val="accent1"/>
+              </a:effectRef>
+              <a:fontRef idx="minor">
+                <a:schemeClr val="lt1"/>
+              </a:fontRef>
+            </p:style>
+            <p:txBody>
+              <a:bodyPr rtlCol="0" anchor="ctr"/>
+              <a:lstStyle/>
+              <a:p>
+                <a:pPr algn="ctr"/>
+                <a:endParaRPr lang="de-DE">
+                  <a:ln>
+                    <a:solidFill>
+                      <a:sysClr val="windowText" lastClr="000000"/>
+                    </a:solidFill>
+                  </a:ln>
+                </a:endParaRPr>
+              </a:p>
+            </p:txBody>
+          </p:sp>
+          <p:cxnSp>
+            <p:nvCxnSpPr>
+              <p:cNvPr id="13" name="Gerader Verbinder 12"/>
+              <p:cNvCxnSpPr>
+                <a:stCxn id="11" idx="7"/>
+                <a:endCxn id="8" idx="3"/>
+              </p:cNvCxnSpPr>
+              <p:nvPr/>
+            </p:nvCxnSpPr>
+            <p:spPr>
+              <a:xfrm flipV="1">
+                <a:off x="8068385" y="3387270"/>
+                <a:ext cx="304409" cy="342009"/>
+              </a:xfrm>
+              <a:prstGeom prst="line">
+                <a:avLst/>
+              </a:prstGeom>
+              <a:ln w="38100">
+                <a:solidFill>
+                  <a:srgbClr val="2A82DA"/>
+                </a:solidFill>
+              </a:ln>
+            </p:spPr>
+            <p:style>
+              <a:lnRef idx="1">
+                <a:schemeClr val="accent1"/>
+              </a:lnRef>
+              <a:fillRef idx="0">
+                <a:schemeClr val="accent1"/>
+              </a:fillRef>
+              <a:effectRef idx="0">
+                <a:schemeClr val="accent1"/>
+              </a:effectRef>
+              <a:fontRef idx="minor">
+                <a:schemeClr val="tx1"/>
+              </a:fontRef>
+            </p:style>
+          </p:cxnSp>
+          <p:cxnSp>
+            <p:nvCxnSpPr>
+              <p:cNvPr id="17" name="Gerader Verbinder 16"/>
+              <p:cNvCxnSpPr>
+                <a:stCxn id="8" idx="2"/>
+                <a:endCxn id="5" idx="6"/>
+              </p:cNvCxnSpPr>
+              <p:nvPr/>
+            </p:nvCxnSpPr>
+            <p:spPr>
+              <a:xfrm flipH="1" flipV="1">
+                <a:off x="8104880" y="3220957"/>
+                <a:ext cx="232646" cy="33138"/>
+              </a:xfrm>
+              <a:prstGeom prst="line">
+                <a:avLst/>
+              </a:prstGeom>
+              <a:ln w="38100">
+                <a:solidFill>
+                  <a:srgbClr val="2A82DA"/>
+                </a:solidFill>
+              </a:ln>
+            </p:spPr>
+            <p:style>
+              <a:lnRef idx="1">
+                <a:schemeClr val="accent1"/>
+              </a:lnRef>
+              <a:fillRef idx="0">
+                <a:schemeClr val="accent1"/>
+              </a:fillRef>
+              <a:effectRef idx="0">
+                <a:schemeClr val="accent1"/>
+              </a:effectRef>
+              <a:fontRef idx="minor">
+                <a:schemeClr val="tx1"/>
+              </a:fontRef>
+            </p:style>
+          </p:cxnSp>
+          <p:cxnSp>
+            <p:nvCxnSpPr>
+              <p:cNvPr id="18" name="Gerader Verbinder 17"/>
+              <p:cNvCxnSpPr>
+                <a:stCxn id="8" idx="1"/>
+                <a:endCxn id="9" idx="5"/>
+              </p:cNvCxnSpPr>
+              <p:nvPr/>
+            </p:nvCxnSpPr>
+            <p:spPr>
+              <a:xfrm flipH="1" flipV="1">
+                <a:off x="8076557" y="2778851"/>
+                <a:ext cx="330201" cy="356137"/>
+              </a:xfrm>
+              <a:prstGeom prst="line">
+                <a:avLst/>
+              </a:prstGeom>
+              <a:ln w="38100">
+                <a:solidFill>
+                  <a:srgbClr val="2A82DA"/>
+                </a:solidFill>
+              </a:ln>
+            </p:spPr>
+            <p:style>
+              <a:lnRef idx="1">
+                <a:schemeClr val="accent1"/>
+              </a:lnRef>
+              <a:fillRef idx="0">
+                <a:schemeClr val="accent1"/>
+              </a:fillRef>
+              <a:effectRef idx="0">
+                <a:schemeClr val="accent1"/>
+              </a:effectRef>
+              <a:fontRef idx="minor">
+                <a:schemeClr val="tx1"/>
+              </a:fontRef>
+            </p:style>
+          </p:cxnSp>
+          <p:cxnSp>
+            <p:nvCxnSpPr>
+              <p:cNvPr id="19" name="Gerader Verbinder 18"/>
+              <p:cNvCxnSpPr>
+                <a:stCxn id="9" idx="3"/>
+                <a:endCxn id="10" idx="7"/>
+              </p:cNvCxnSpPr>
+              <p:nvPr/>
+            </p:nvCxnSpPr>
+            <p:spPr>
+              <a:xfrm flipH="1">
+                <a:off x="7453932" y="2845708"/>
+                <a:ext cx="377004" cy="612721"/>
+              </a:xfrm>
+              <a:prstGeom prst="line">
+                <a:avLst/>
+              </a:prstGeom>
+              <a:ln w="38100">
+                <a:solidFill>
+                  <a:srgbClr val="2A82DA"/>
+                </a:solidFill>
+              </a:ln>
+            </p:spPr>
+            <p:style>
+              <a:lnRef idx="1">
+                <a:schemeClr val="accent1"/>
+              </a:lnRef>
+              <a:fillRef idx="0">
+                <a:schemeClr val="accent1"/>
+              </a:fillRef>
+              <a:effectRef idx="0">
+                <a:schemeClr val="accent1"/>
+              </a:effectRef>
+              <a:fontRef idx="minor">
+                <a:schemeClr val="tx1"/>
+              </a:fontRef>
+            </p:style>
+          </p:cxnSp>
+          <p:cxnSp>
+            <p:nvCxnSpPr>
+              <p:cNvPr id="20" name="Gerader Verbinder 19"/>
+              <p:cNvCxnSpPr>
+                <a:stCxn id="10" idx="5"/>
+                <a:endCxn id="11" idx="2"/>
+              </p:cNvCxnSpPr>
+              <p:nvPr/>
+            </p:nvCxnSpPr>
+            <p:spPr>
+              <a:xfrm>
+                <a:off x="7453932" y="3712987"/>
+                <a:ext cx="313954" cy="158843"/>
+              </a:xfrm>
+              <a:prstGeom prst="line">
+                <a:avLst/>
+              </a:prstGeom>
+              <a:ln w="38100">
+                <a:solidFill>
+                  <a:srgbClr val="2A82DA"/>
+                </a:solidFill>
+              </a:ln>
+            </p:spPr>
+            <p:style>
+              <a:lnRef idx="1">
+                <a:schemeClr val="accent1"/>
+              </a:lnRef>
+              <a:fillRef idx="0">
+                <a:schemeClr val="accent1"/>
+              </a:fillRef>
+              <a:effectRef idx="0">
+                <a:schemeClr val="accent1"/>
+              </a:effectRef>
+              <a:fontRef idx="minor">
+                <a:schemeClr val="tx1"/>
+              </a:fontRef>
+            </p:style>
+          </p:cxnSp>
+          <p:cxnSp>
+            <p:nvCxnSpPr>
+              <p:cNvPr id="21" name="Gerader Verbinder 20"/>
+              <p:cNvCxnSpPr>
+                <a:stCxn id="11" idx="0"/>
+                <a:endCxn id="5" idx="4"/>
+              </p:cNvCxnSpPr>
+              <p:nvPr/>
+            </p:nvCxnSpPr>
+            <p:spPr>
+              <a:xfrm flipH="1" flipV="1">
+                <a:off x="7907418" y="3381609"/>
+                <a:ext cx="31201" cy="301408"/>
+              </a:xfrm>
+              <a:prstGeom prst="line">
+                <a:avLst/>
+              </a:prstGeom>
+              <a:ln w="38100">
+                <a:solidFill>
+                  <a:srgbClr val="2A82DA"/>
+                </a:solidFill>
+              </a:ln>
+            </p:spPr>
+            <p:style>
+              <a:lnRef idx="1">
+                <a:schemeClr val="accent1"/>
+              </a:lnRef>
+              <a:fillRef idx="0">
+                <a:schemeClr val="accent1"/>
+              </a:fillRef>
+              <a:effectRef idx="0">
+                <a:schemeClr val="accent1"/>
+              </a:effectRef>
+              <a:fontRef idx="minor">
+                <a:schemeClr val="tx1"/>
+              </a:fontRef>
+            </p:style>
+          </p:cxnSp>
+          <p:cxnSp>
+            <p:nvCxnSpPr>
+              <p:cNvPr id="22" name="Gerader Verbinder 21"/>
+              <p:cNvCxnSpPr>
+                <a:stCxn id="11" idx="1"/>
+                <a:endCxn id="7" idx="5"/>
+              </p:cNvCxnSpPr>
+              <p:nvPr/>
+            </p:nvCxnSpPr>
+            <p:spPr>
+              <a:xfrm flipH="1" flipV="1">
+                <a:off x="7409160" y="3078566"/>
+                <a:ext cx="404988" cy="663498"/>
+              </a:xfrm>
+              <a:prstGeom prst="line">
+                <a:avLst/>
+              </a:prstGeom>
+              <a:ln w="38100">
+                <a:solidFill>
+                  <a:srgbClr val="2A82DA"/>
+                </a:solidFill>
+              </a:ln>
+            </p:spPr>
+            <p:style>
+              <a:lnRef idx="1">
+                <a:schemeClr val="accent1"/>
+              </a:lnRef>
+              <a:fillRef idx="0">
+                <a:schemeClr val="accent1"/>
+              </a:fillRef>
+              <a:effectRef idx="0">
+                <a:schemeClr val="accent1"/>
+              </a:effectRef>
+              <a:fontRef idx="minor">
+                <a:schemeClr val="tx1"/>
+              </a:fontRef>
+            </p:style>
+          </p:cxnSp>
+          <p:cxnSp>
+            <p:nvCxnSpPr>
+              <p:cNvPr id="23" name="Gerader Verbinder 22"/>
+              <p:cNvCxnSpPr>
+                <a:stCxn id="5" idx="1"/>
+                <a:endCxn id="7" idx="6"/>
+              </p:cNvCxnSpPr>
+              <p:nvPr/>
+            </p:nvCxnSpPr>
+            <p:spPr>
+              <a:xfrm flipH="1" flipV="1">
+                <a:off x="7502324" y="2977078"/>
+                <a:ext cx="309902" cy="85848"/>
+              </a:xfrm>
+              <a:prstGeom prst="line">
+                <a:avLst/>
+              </a:prstGeom>
+              <a:ln w="38100">
+                <a:solidFill>
+                  <a:srgbClr val="2A82DA"/>
+                </a:solidFill>
+              </a:ln>
+            </p:spPr>
+            <p:style>
+              <a:lnRef idx="1">
+                <a:schemeClr val="accent1"/>
+              </a:lnRef>
+              <a:fillRef idx="0">
+                <a:schemeClr val="accent1"/>
+              </a:fillRef>
+              <a:effectRef idx="0">
+                <a:schemeClr val="accent1"/>
+              </a:effectRef>
+              <a:fontRef idx="minor">
+                <a:schemeClr val="tx1"/>
+              </a:fontRef>
+            </p:style>
+          </p:cxnSp>
+          <p:cxnSp>
+            <p:nvCxnSpPr>
+              <p:cNvPr id="24" name="Gerader Verbinder 23"/>
+              <p:cNvCxnSpPr>
+                <a:stCxn id="9" idx="2"/>
+                <a:endCxn id="7" idx="7"/>
+              </p:cNvCxnSpPr>
+              <p:nvPr/>
+            </p:nvCxnSpPr>
+            <p:spPr>
+              <a:xfrm flipH="1">
+                <a:off x="7496438" y="2736745"/>
+                <a:ext cx="250199" cy="102693"/>
+              </a:xfrm>
+              <a:prstGeom prst="line">
+                <a:avLst/>
+              </a:prstGeom>
+              <a:ln w="38100">
+                <a:solidFill>
+                  <a:srgbClr val="2A82DA"/>
+                </a:solidFill>
+              </a:ln>
+            </p:spPr>
+            <p:style>
+              <a:lnRef idx="1">
+                <a:schemeClr val="accent1"/>
+              </a:lnRef>
+              <a:fillRef idx="0">
+                <a:schemeClr val="accent1"/>
+              </a:fillRef>
+              <a:effectRef idx="0">
+                <a:schemeClr val="accent1"/>
+              </a:effectRef>
+              <a:fontRef idx="minor">
+                <a:schemeClr val="tx1"/>
+              </a:fontRef>
+            </p:style>
+          </p:cxnSp>
+        </p:grpSp>
         <p:sp>
           <p:nvSpPr>
-            <p:cNvPr id="5" name="Ellipse 4"/>
+            <p:cNvPr id="25" name="Rechteck 24">
+              <a:extLst>
+                <a:ext uri="{FF2B5EF4-FFF2-40B4-BE49-F238E27FC236}">
+                  <a16:creationId xmlns:a16="http://schemas.microsoft.com/office/drawing/2014/main" id="{82188E18-3834-471B-9157-6606B8D2FBC5}"/>
+                </a:ext>
+              </a:extLst>
+            </p:cNvPr>
             <p:cNvSpPr/>
             <p:nvPr/>
           </p:nvSpPr>
           <p:spPr>
-            <a:xfrm rot="352134">
-              <a:off x="7745823" y="3022552"/>
-              <a:ext cx="360000" cy="360000"/>
+            <a:xfrm>
+              <a:off x="5556000" y="2889000"/>
+              <a:ext cx="1080000" cy="1080000"/>
             </a:xfrm>
-            <a:prstGeom prst="ellipse">
+            <a:prstGeom prst="rect">
               <a:avLst/>
             </a:prstGeom>
             <a:noFill/>
-            <a:ln w="38100">
-              <a:solidFill>
-                <a:srgbClr val="2A82DA"/>
-              </a:solidFill>
+            <a:ln w="28575">
+              <a:noFill/>
             </a:ln>
           </p:spPr>
           <p:style>
@@ -16812,618 +17491,10 @@
             <a:lstStyle/>
             <a:p>
               <a:pPr algn="ctr"/>
-              <a:endParaRPr lang="de-DE">
-                <a:ln>
-                  <a:solidFill>
-                    <a:sysClr val="windowText" lastClr="000000"/>
-                  </a:solidFill>
-                </a:ln>
-              </a:endParaRPr>
+              <a:endParaRPr lang="en-US"/>
             </a:p>
           </p:txBody>
         </p:sp>
-        <p:sp>
-          <p:nvSpPr>
-            <p:cNvPr id="7" name="Ellipse 6"/>
-            <p:cNvSpPr/>
-            <p:nvPr/>
-          </p:nvSpPr>
-          <p:spPr>
-            <a:xfrm rot="1203084">
-              <a:off x="7153235" y="2735363"/>
-              <a:ext cx="360000" cy="360000"/>
-            </a:xfrm>
-            <a:prstGeom prst="ellipse">
-              <a:avLst/>
-            </a:prstGeom>
-            <a:noFill/>
-            <a:ln w="38100">
-              <a:solidFill>
-                <a:srgbClr val="2A82DA"/>
-              </a:solidFill>
-            </a:ln>
-          </p:spPr>
-          <p:style>
-            <a:lnRef idx="2">
-              <a:schemeClr val="accent1">
-                <a:shade val="50000"/>
-              </a:schemeClr>
-            </a:lnRef>
-            <a:fillRef idx="1">
-              <a:schemeClr val="accent1"/>
-            </a:fillRef>
-            <a:effectRef idx="0">
-              <a:schemeClr val="accent1"/>
-            </a:effectRef>
-            <a:fontRef idx="minor">
-              <a:schemeClr val="lt1"/>
-            </a:fontRef>
-          </p:style>
-          <p:txBody>
-            <a:bodyPr rtlCol="0" anchor="ctr"/>
-            <a:lstStyle/>
-            <a:p>
-              <a:pPr algn="ctr"/>
-              <a:endParaRPr lang="de-DE">
-                <a:ln>
-                  <a:solidFill>
-                    <a:sysClr val="windowText" lastClr="000000"/>
-                  </a:solidFill>
-                </a:ln>
-              </a:endParaRPr>
-            </a:p>
-          </p:txBody>
-        </p:sp>
-        <p:sp>
-          <p:nvSpPr>
-            <p:cNvPr id="8" name="Ellipse 7"/>
-            <p:cNvSpPr/>
-            <p:nvPr/>
-          </p:nvSpPr>
-          <p:spPr>
-            <a:xfrm rot="460048">
-              <a:off x="8335917" y="3098111"/>
-              <a:ext cx="360000" cy="360000"/>
-            </a:xfrm>
-            <a:prstGeom prst="ellipse">
-              <a:avLst/>
-            </a:prstGeom>
-            <a:noFill/>
-            <a:ln w="38100">
-              <a:solidFill>
-                <a:srgbClr val="2A82DA"/>
-              </a:solidFill>
-            </a:ln>
-          </p:spPr>
-          <p:style>
-            <a:lnRef idx="2">
-              <a:schemeClr val="accent1">
-                <a:shade val="50000"/>
-              </a:schemeClr>
-            </a:lnRef>
-            <a:fillRef idx="1">
-              <a:schemeClr val="accent1"/>
-            </a:fillRef>
-            <a:effectRef idx="0">
-              <a:schemeClr val="accent1"/>
-            </a:effectRef>
-            <a:fontRef idx="minor">
-              <a:schemeClr val="lt1"/>
-            </a:fontRef>
-          </p:style>
-          <p:txBody>
-            <a:bodyPr rtlCol="0" anchor="ctr"/>
-            <a:lstStyle/>
-            <a:p>
-              <a:pPr algn="ctr"/>
-              <a:endParaRPr lang="de-DE">
-                <a:ln>
-                  <a:solidFill>
-                    <a:sysClr val="windowText" lastClr="000000"/>
-                  </a:solidFill>
-                </a:ln>
-              </a:endParaRPr>
-            </a:p>
-          </p:txBody>
-        </p:sp>
-        <p:sp>
-          <p:nvSpPr>
-            <p:cNvPr id="9" name="Ellipse 8"/>
-            <p:cNvSpPr/>
-            <p:nvPr/>
-          </p:nvSpPr>
-          <p:spPr>
-            <a:xfrm rot="20686386">
-              <a:off x="7740318" y="2509469"/>
-              <a:ext cx="360000" cy="360000"/>
-            </a:xfrm>
-            <a:prstGeom prst="ellipse">
-              <a:avLst/>
-            </a:prstGeom>
-            <a:noFill/>
-            <a:ln w="38100">
-              <a:solidFill>
-                <a:srgbClr val="2A82DA"/>
-              </a:solidFill>
-            </a:ln>
-          </p:spPr>
-          <p:style>
-            <a:lnRef idx="2">
-              <a:schemeClr val="accent1">
-                <a:shade val="50000"/>
-              </a:schemeClr>
-            </a:lnRef>
-            <a:fillRef idx="1">
-              <a:schemeClr val="accent1"/>
-            </a:fillRef>
-            <a:effectRef idx="0">
-              <a:schemeClr val="accent1"/>
-            </a:effectRef>
-            <a:fontRef idx="minor">
-              <a:schemeClr val="lt1"/>
-            </a:fontRef>
-          </p:style>
-          <p:txBody>
-            <a:bodyPr rtlCol="0" anchor="ctr"/>
-            <a:lstStyle/>
-            <a:p>
-              <a:pPr algn="ctr"/>
-              <a:endParaRPr lang="de-DE">
-                <a:ln>
-                  <a:solidFill>
-                    <a:sysClr val="windowText" lastClr="000000"/>
-                  </a:solidFill>
-                </a:ln>
-              </a:endParaRPr>
-            </a:p>
-          </p:txBody>
-        </p:sp>
-        <p:sp>
-          <p:nvSpPr>
-            <p:cNvPr id="10" name="Ellipse 9"/>
-            <p:cNvSpPr/>
-            <p:nvPr/>
-          </p:nvSpPr>
-          <p:spPr>
-            <a:xfrm>
-              <a:off x="7146653" y="3405708"/>
-              <a:ext cx="360000" cy="360000"/>
-            </a:xfrm>
-            <a:prstGeom prst="ellipse">
-              <a:avLst/>
-            </a:prstGeom>
-            <a:noFill/>
-            <a:ln w="38100">
-              <a:solidFill>
-                <a:srgbClr val="2A82DA"/>
-              </a:solidFill>
-            </a:ln>
-          </p:spPr>
-          <p:style>
-            <a:lnRef idx="2">
-              <a:schemeClr val="accent1">
-                <a:shade val="50000"/>
-              </a:schemeClr>
-            </a:lnRef>
-            <a:fillRef idx="1">
-              <a:schemeClr val="accent1"/>
-            </a:fillRef>
-            <a:effectRef idx="0">
-              <a:schemeClr val="accent1"/>
-            </a:effectRef>
-            <a:fontRef idx="minor">
-              <a:schemeClr val="lt1"/>
-            </a:fontRef>
-          </p:style>
-          <p:txBody>
-            <a:bodyPr rtlCol="0" anchor="ctr"/>
-            <a:lstStyle/>
-            <a:p>
-              <a:pPr algn="ctr"/>
-              <a:endParaRPr lang="de-DE">
-                <a:ln>
-                  <a:solidFill>
-                    <a:sysClr val="windowText" lastClr="000000"/>
-                  </a:solidFill>
-                </a:ln>
-              </a:endParaRPr>
-            </a:p>
-          </p:txBody>
-        </p:sp>
-        <p:sp>
-          <p:nvSpPr>
-            <p:cNvPr id="11" name="Ellipse 10"/>
-            <p:cNvSpPr/>
-            <p:nvPr/>
-          </p:nvSpPr>
-          <p:spPr>
-            <a:xfrm rot="21427267">
-              <a:off x="7767659" y="3682790"/>
-              <a:ext cx="360000" cy="360000"/>
-            </a:xfrm>
-            <a:prstGeom prst="ellipse">
-              <a:avLst/>
-            </a:prstGeom>
-            <a:noFill/>
-            <a:ln w="38100">
-              <a:solidFill>
-                <a:srgbClr val="2A82DA"/>
-              </a:solidFill>
-            </a:ln>
-          </p:spPr>
-          <p:style>
-            <a:lnRef idx="2">
-              <a:schemeClr val="accent1">
-                <a:shade val="50000"/>
-              </a:schemeClr>
-            </a:lnRef>
-            <a:fillRef idx="1">
-              <a:schemeClr val="accent1"/>
-            </a:fillRef>
-            <a:effectRef idx="0">
-              <a:schemeClr val="accent1"/>
-            </a:effectRef>
-            <a:fontRef idx="minor">
-              <a:schemeClr val="lt1"/>
-            </a:fontRef>
-          </p:style>
-          <p:txBody>
-            <a:bodyPr rtlCol="0" anchor="ctr"/>
-            <a:lstStyle/>
-            <a:p>
-              <a:pPr algn="ctr"/>
-              <a:endParaRPr lang="de-DE">
-                <a:ln>
-                  <a:solidFill>
-                    <a:sysClr val="windowText" lastClr="000000"/>
-                  </a:solidFill>
-                </a:ln>
-              </a:endParaRPr>
-            </a:p>
-          </p:txBody>
-        </p:sp>
-        <p:cxnSp>
-          <p:nvCxnSpPr>
-            <p:cNvPr id="13" name="Gerader Verbinder 12"/>
-            <p:cNvCxnSpPr>
-              <a:stCxn id="11" idx="7"/>
-              <a:endCxn id="8" idx="3"/>
-            </p:cNvCxnSpPr>
-            <p:nvPr/>
-          </p:nvCxnSpPr>
-          <p:spPr>
-            <a:xfrm flipV="1">
-              <a:off x="8068385" y="3387270"/>
-              <a:ext cx="304409" cy="342009"/>
-            </a:xfrm>
-            <a:prstGeom prst="line">
-              <a:avLst/>
-            </a:prstGeom>
-            <a:ln w="38100">
-              <a:solidFill>
-                <a:srgbClr val="2A82DA"/>
-              </a:solidFill>
-            </a:ln>
-          </p:spPr>
-          <p:style>
-            <a:lnRef idx="1">
-              <a:schemeClr val="accent1"/>
-            </a:lnRef>
-            <a:fillRef idx="0">
-              <a:schemeClr val="accent1"/>
-            </a:fillRef>
-            <a:effectRef idx="0">
-              <a:schemeClr val="accent1"/>
-            </a:effectRef>
-            <a:fontRef idx="minor">
-              <a:schemeClr val="tx1"/>
-            </a:fontRef>
-          </p:style>
-        </p:cxnSp>
-        <p:cxnSp>
-          <p:nvCxnSpPr>
-            <p:cNvPr id="17" name="Gerader Verbinder 16"/>
-            <p:cNvCxnSpPr>
-              <a:stCxn id="8" idx="2"/>
-              <a:endCxn id="5" idx="6"/>
-            </p:cNvCxnSpPr>
-            <p:nvPr/>
-          </p:nvCxnSpPr>
-          <p:spPr>
-            <a:xfrm flipH="1" flipV="1">
-              <a:off x="8104880" y="3220957"/>
-              <a:ext cx="232646" cy="33138"/>
-            </a:xfrm>
-            <a:prstGeom prst="line">
-              <a:avLst/>
-            </a:prstGeom>
-            <a:ln w="38100">
-              <a:solidFill>
-                <a:srgbClr val="2A82DA"/>
-              </a:solidFill>
-            </a:ln>
-          </p:spPr>
-          <p:style>
-            <a:lnRef idx="1">
-              <a:schemeClr val="accent1"/>
-            </a:lnRef>
-            <a:fillRef idx="0">
-              <a:schemeClr val="accent1"/>
-            </a:fillRef>
-            <a:effectRef idx="0">
-              <a:schemeClr val="accent1"/>
-            </a:effectRef>
-            <a:fontRef idx="minor">
-              <a:schemeClr val="tx1"/>
-            </a:fontRef>
-          </p:style>
-        </p:cxnSp>
-        <p:cxnSp>
-          <p:nvCxnSpPr>
-            <p:cNvPr id="18" name="Gerader Verbinder 17"/>
-            <p:cNvCxnSpPr>
-              <a:stCxn id="8" idx="1"/>
-              <a:endCxn id="9" idx="5"/>
-            </p:cNvCxnSpPr>
-            <p:nvPr/>
-          </p:nvCxnSpPr>
-          <p:spPr>
-            <a:xfrm flipH="1" flipV="1">
-              <a:off x="8076557" y="2778851"/>
-              <a:ext cx="330201" cy="356137"/>
-            </a:xfrm>
-            <a:prstGeom prst="line">
-              <a:avLst/>
-            </a:prstGeom>
-            <a:ln w="38100">
-              <a:solidFill>
-                <a:srgbClr val="2A82DA"/>
-              </a:solidFill>
-            </a:ln>
-          </p:spPr>
-          <p:style>
-            <a:lnRef idx="1">
-              <a:schemeClr val="accent1"/>
-            </a:lnRef>
-            <a:fillRef idx="0">
-              <a:schemeClr val="accent1"/>
-            </a:fillRef>
-            <a:effectRef idx="0">
-              <a:schemeClr val="accent1"/>
-            </a:effectRef>
-            <a:fontRef idx="minor">
-              <a:schemeClr val="tx1"/>
-            </a:fontRef>
-          </p:style>
-        </p:cxnSp>
-        <p:cxnSp>
-          <p:nvCxnSpPr>
-            <p:cNvPr id="19" name="Gerader Verbinder 18"/>
-            <p:cNvCxnSpPr>
-              <a:stCxn id="9" idx="3"/>
-              <a:endCxn id="10" idx="7"/>
-            </p:cNvCxnSpPr>
-            <p:nvPr/>
-          </p:nvCxnSpPr>
-          <p:spPr>
-            <a:xfrm flipH="1">
-              <a:off x="7453932" y="2845708"/>
-              <a:ext cx="377004" cy="612721"/>
-            </a:xfrm>
-            <a:prstGeom prst="line">
-              <a:avLst/>
-            </a:prstGeom>
-            <a:ln w="38100">
-              <a:solidFill>
-                <a:srgbClr val="2A82DA"/>
-              </a:solidFill>
-            </a:ln>
-          </p:spPr>
-          <p:style>
-            <a:lnRef idx="1">
-              <a:schemeClr val="accent1"/>
-            </a:lnRef>
-            <a:fillRef idx="0">
-              <a:schemeClr val="accent1"/>
-            </a:fillRef>
-            <a:effectRef idx="0">
-              <a:schemeClr val="accent1"/>
-            </a:effectRef>
-            <a:fontRef idx="minor">
-              <a:schemeClr val="tx1"/>
-            </a:fontRef>
-          </p:style>
-        </p:cxnSp>
-        <p:cxnSp>
-          <p:nvCxnSpPr>
-            <p:cNvPr id="20" name="Gerader Verbinder 19"/>
-            <p:cNvCxnSpPr>
-              <a:stCxn id="10" idx="5"/>
-              <a:endCxn id="11" idx="2"/>
-            </p:cNvCxnSpPr>
-            <p:nvPr/>
-          </p:nvCxnSpPr>
-          <p:spPr>
-            <a:xfrm>
-              <a:off x="7453932" y="3712987"/>
-              <a:ext cx="313954" cy="158843"/>
-            </a:xfrm>
-            <a:prstGeom prst="line">
-              <a:avLst/>
-            </a:prstGeom>
-            <a:ln w="38100">
-              <a:solidFill>
-                <a:srgbClr val="2A82DA"/>
-              </a:solidFill>
-            </a:ln>
-          </p:spPr>
-          <p:style>
-            <a:lnRef idx="1">
-              <a:schemeClr val="accent1"/>
-            </a:lnRef>
-            <a:fillRef idx="0">
-              <a:schemeClr val="accent1"/>
-            </a:fillRef>
-            <a:effectRef idx="0">
-              <a:schemeClr val="accent1"/>
-            </a:effectRef>
-            <a:fontRef idx="minor">
-              <a:schemeClr val="tx1"/>
-            </a:fontRef>
-          </p:style>
-        </p:cxnSp>
-        <p:cxnSp>
-          <p:nvCxnSpPr>
-            <p:cNvPr id="21" name="Gerader Verbinder 20"/>
-            <p:cNvCxnSpPr>
-              <a:stCxn id="11" idx="0"/>
-              <a:endCxn id="5" idx="4"/>
-            </p:cNvCxnSpPr>
-            <p:nvPr/>
-          </p:nvCxnSpPr>
-          <p:spPr>
-            <a:xfrm flipH="1" flipV="1">
-              <a:off x="7907418" y="3381609"/>
-              <a:ext cx="31201" cy="301408"/>
-            </a:xfrm>
-            <a:prstGeom prst="line">
-              <a:avLst/>
-            </a:prstGeom>
-            <a:ln w="38100">
-              <a:solidFill>
-                <a:srgbClr val="2A82DA"/>
-              </a:solidFill>
-            </a:ln>
-          </p:spPr>
-          <p:style>
-            <a:lnRef idx="1">
-              <a:schemeClr val="accent1"/>
-            </a:lnRef>
-            <a:fillRef idx="0">
-              <a:schemeClr val="accent1"/>
-            </a:fillRef>
-            <a:effectRef idx="0">
-              <a:schemeClr val="accent1"/>
-            </a:effectRef>
-            <a:fontRef idx="minor">
-              <a:schemeClr val="tx1"/>
-            </a:fontRef>
-          </p:style>
-        </p:cxnSp>
-        <p:cxnSp>
-          <p:nvCxnSpPr>
-            <p:cNvPr id="22" name="Gerader Verbinder 21"/>
-            <p:cNvCxnSpPr>
-              <a:stCxn id="11" idx="1"/>
-              <a:endCxn id="7" idx="5"/>
-            </p:cNvCxnSpPr>
-            <p:nvPr/>
-          </p:nvCxnSpPr>
-          <p:spPr>
-            <a:xfrm flipH="1" flipV="1">
-              <a:off x="7409160" y="3078566"/>
-              <a:ext cx="404988" cy="663498"/>
-            </a:xfrm>
-            <a:prstGeom prst="line">
-              <a:avLst/>
-            </a:prstGeom>
-            <a:ln w="38100">
-              <a:solidFill>
-                <a:srgbClr val="2A82DA"/>
-              </a:solidFill>
-            </a:ln>
-          </p:spPr>
-          <p:style>
-            <a:lnRef idx="1">
-              <a:schemeClr val="accent1"/>
-            </a:lnRef>
-            <a:fillRef idx="0">
-              <a:schemeClr val="accent1"/>
-            </a:fillRef>
-            <a:effectRef idx="0">
-              <a:schemeClr val="accent1"/>
-            </a:effectRef>
-            <a:fontRef idx="minor">
-              <a:schemeClr val="tx1"/>
-            </a:fontRef>
-          </p:style>
-        </p:cxnSp>
-        <p:cxnSp>
-          <p:nvCxnSpPr>
-            <p:cNvPr id="23" name="Gerader Verbinder 22"/>
-            <p:cNvCxnSpPr>
-              <a:stCxn id="5" idx="1"/>
-              <a:endCxn id="7" idx="6"/>
-            </p:cNvCxnSpPr>
-            <p:nvPr/>
-          </p:nvCxnSpPr>
-          <p:spPr>
-            <a:xfrm flipH="1" flipV="1">
-              <a:off x="7502324" y="2977078"/>
-              <a:ext cx="309902" cy="85848"/>
-            </a:xfrm>
-            <a:prstGeom prst="line">
-              <a:avLst/>
-            </a:prstGeom>
-            <a:ln w="38100">
-              <a:solidFill>
-                <a:srgbClr val="2A82DA"/>
-              </a:solidFill>
-            </a:ln>
-          </p:spPr>
-          <p:style>
-            <a:lnRef idx="1">
-              <a:schemeClr val="accent1"/>
-            </a:lnRef>
-            <a:fillRef idx="0">
-              <a:schemeClr val="accent1"/>
-            </a:fillRef>
-            <a:effectRef idx="0">
-              <a:schemeClr val="accent1"/>
-            </a:effectRef>
-            <a:fontRef idx="minor">
-              <a:schemeClr val="tx1"/>
-            </a:fontRef>
-          </p:style>
-        </p:cxnSp>
-        <p:cxnSp>
-          <p:nvCxnSpPr>
-            <p:cNvPr id="24" name="Gerader Verbinder 23"/>
-            <p:cNvCxnSpPr>
-              <a:stCxn id="9" idx="2"/>
-              <a:endCxn id="7" idx="7"/>
-            </p:cNvCxnSpPr>
-            <p:nvPr/>
-          </p:nvCxnSpPr>
-          <p:spPr>
-            <a:xfrm flipH="1">
-              <a:off x="7496438" y="2736745"/>
-              <a:ext cx="250199" cy="102693"/>
-            </a:xfrm>
-            <a:prstGeom prst="line">
-              <a:avLst/>
-            </a:prstGeom>
-            <a:ln w="38100">
-              <a:solidFill>
-                <a:srgbClr val="2A82DA"/>
-              </a:solidFill>
-            </a:ln>
-          </p:spPr>
-          <p:style>
-            <a:lnRef idx="1">
-              <a:schemeClr val="accent1"/>
-            </a:lnRef>
-            <a:fillRef idx="0">
-              <a:schemeClr val="accent1"/>
-            </a:fillRef>
-            <a:effectRef idx="0">
-              <a:schemeClr val="accent1"/>
-            </a:effectRef>
-            <a:fontRef idx="minor">
-              <a:schemeClr val="tx1"/>
-            </a:fontRef>
-          </p:style>
-        </p:cxnSp>
       </p:grpSp>
     </p:spTree>
     <p:extLst>

</xml_diff>